<commit_message>
deleted rare name slide
</commit_message>
<xml_diff>
--- a/Project1-ExploreVis/JieleiZhu/Bootcamp_ Project#1.pptx
+++ b/Project1-ExploreVis/JieleiZhu/Bootcamp_ Project#1.pptx
@@ -5,7 +5,7 @@
     <p:sldMasterId id="2147483659" r:id="rId1"/>
   </p:sldMasterIdLst>
   <p:notesMasterIdLst>
-    <p:notesMasterId r:id="rId20"/>
+    <p:notesMasterId r:id="rId19"/>
   </p:notesMasterIdLst>
   <p:sldIdLst>
     <p:sldId id="256" r:id="rId2"/>
@@ -18,14 +18,13 @@
     <p:sldId id="263" r:id="rId9"/>
     <p:sldId id="264" r:id="rId10"/>
     <p:sldId id="265" r:id="rId11"/>
-    <p:sldId id="266" r:id="rId12"/>
-    <p:sldId id="267" r:id="rId13"/>
-    <p:sldId id="268" r:id="rId14"/>
-    <p:sldId id="269" r:id="rId15"/>
-    <p:sldId id="270" r:id="rId16"/>
-    <p:sldId id="271" r:id="rId17"/>
-    <p:sldId id="272" r:id="rId18"/>
-    <p:sldId id="273" r:id="rId19"/>
+    <p:sldId id="267" r:id="rId12"/>
+    <p:sldId id="268" r:id="rId13"/>
+    <p:sldId id="269" r:id="rId14"/>
+    <p:sldId id="270" r:id="rId15"/>
+    <p:sldId id="271" r:id="rId16"/>
+    <p:sldId id="272" r:id="rId17"/>
+    <p:sldId id="273" r:id="rId18"/>
   </p:sldIdLst>
   <p:sldSz cx="9144000" cy="5143500" type="screen16x9"/>
   <p:notesSz cx="6858000" cy="9144000"/>
@@ -703,7 +702,7 @@
   <p:cSld>
     <p:spTree>
       <p:nvGrpSpPr>
-        <p:cNvPr id="1" name="Shape 119"/>
+        <p:cNvPr id="1" name="Shape 124"/>
         <p:cNvGrpSpPr/>
         <p:nvPr/>
       </p:nvGrpSpPr>
@@ -717,7 +716,7 @@
       </p:grpSpPr>
       <p:sp>
         <p:nvSpPr>
-          <p:cNvPr id="120" name="Shape 120"/>
+          <p:cNvPr id="125" name="Shape 125"/>
           <p:cNvSpPr>
             <a:spLocks noGrp="1" noRot="1" noChangeAspect="1"/>
           </p:cNvSpPr>
@@ -758,7 +757,7 @@
       </p:sp>
       <p:sp>
         <p:nvSpPr>
-          <p:cNvPr id="121" name="Shape 121"/>
+          <p:cNvPr id="126" name="Shape 126"/>
           <p:cNvSpPr txBox="1">
             <a:spLocks noGrp="1"/>
           </p:cNvSpPr>
@@ -800,107 +799,6 @@
 </file>
 
 <file path=ppt/notesSlides/notesSlide12.xml><?xml version="1.0" encoding="utf-8"?>
-<p:notes xmlns:a="http://schemas.openxmlformats.org/drawingml/2006/main" xmlns:r="http://schemas.openxmlformats.org/officeDocument/2006/relationships" xmlns:p="http://schemas.openxmlformats.org/presentationml/2006/main" showMasterSp="0" showMasterPhAnim="0">
-  <p:cSld>
-    <p:spTree>
-      <p:nvGrpSpPr>
-        <p:cNvPr id="1" name="Shape 124"/>
-        <p:cNvGrpSpPr/>
-        <p:nvPr/>
-      </p:nvGrpSpPr>
-      <p:grpSpPr>
-        <a:xfrm>
-          <a:off x="0" y="0"/>
-          <a:ext cx="0" cy="0"/>
-          <a:chOff x="0" y="0"/>
-          <a:chExt cx="0" cy="0"/>
-        </a:xfrm>
-      </p:grpSpPr>
-      <p:sp>
-        <p:nvSpPr>
-          <p:cNvPr id="125" name="Shape 125"/>
-          <p:cNvSpPr>
-            <a:spLocks noGrp="1" noRot="1" noChangeAspect="1"/>
-          </p:cNvSpPr>
-          <p:nvPr>
-            <p:ph type="sldImg" idx="2"/>
-          </p:nvPr>
-        </p:nvSpPr>
-        <p:spPr>
-          <a:xfrm>
-            <a:off x="381300" y="685800"/>
-            <a:ext cx="6096000" cy="3429000"/>
-          </a:xfrm>
-          <a:custGeom>
-            <a:avLst/>
-            <a:gdLst/>
-            <a:ahLst/>
-            <a:cxnLst/>
-            <a:rect l="0" t="0" r="0" b="0"/>
-            <a:pathLst>
-              <a:path w="120000" h="120000" extrusionOk="0">
-                <a:moveTo>
-                  <a:pt x="0" y="0"/>
-                </a:moveTo>
-                <a:lnTo>
-                  <a:pt x="120000" y="0"/>
-                </a:lnTo>
-                <a:lnTo>
-                  <a:pt x="120000" y="120000"/>
-                </a:lnTo>
-                <a:lnTo>
-                  <a:pt x="0" y="120000"/>
-                </a:lnTo>
-                <a:close/>
-              </a:path>
-            </a:pathLst>
-          </a:custGeom>
-        </p:spPr>
-      </p:sp>
-      <p:sp>
-        <p:nvSpPr>
-          <p:cNvPr id="126" name="Shape 126"/>
-          <p:cNvSpPr txBox="1">
-            <a:spLocks noGrp="1"/>
-          </p:cNvSpPr>
-          <p:nvPr>
-            <p:ph type="body" idx="1"/>
-          </p:nvPr>
-        </p:nvSpPr>
-        <p:spPr>
-          <a:xfrm>
-            <a:off x="685800" y="4343400"/>
-            <a:ext cx="5486400" cy="4114800"/>
-          </a:xfrm>
-          <a:prstGeom prst="rect">
-            <a:avLst/>
-          </a:prstGeom>
-        </p:spPr>
-        <p:txBody>
-          <a:bodyPr lIns="91425" tIns="91425" rIns="91425" bIns="91425" anchor="t" anchorCtr="0">
-            <a:noAutofit/>
-          </a:bodyPr>
-          <a:lstStyle/>
-          <a:p>
-            <a:pPr lvl="0">
-              <a:spcBef>
-                <a:spcPts val="0"/>
-              </a:spcBef>
-              <a:buNone/>
-            </a:pPr>
-            <a:endParaRPr/>
-          </a:p>
-        </p:txBody>
-      </p:sp>
-    </p:spTree>
-  </p:cSld>
-  <p:clrMapOvr>
-    <a:masterClrMapping/>
-  </p:clrMapOvr>
-</p:notes>
-</file>
-
-<file path=ppt/notesSlides/notesSlide13.xml><?xml version="1.0" encoding="utf-8"?>
 <p:notes xmlns:a="http://schemas.openxmlformats.org/drawingml/2006/main" xmlns:r="http://schemas.openxmlformats.org/officeDocument/2006/relationships" xmlns:p="http://schemas.openxmlformats.org/presentationml/2006/main" showMasterSp="0" showMasterPhAnim="0">
   <p:cSld>
     <p:spTree>
@@ -1001,7 +899,7 @@
 </p:notes>
 </file>
 
-<file path=ppt/notesSlides/notesSlide14.xml><?xml version="1.0" encoding="utf-8"?>
+<file path=ppt/notesSlides/notesSlide13.xml><?xml version="1.0" encoding="utf-8"?>
 <p:notes xmlns:a="http://schemas.openxmlformats.org/drawingml/2006/main" xmlns:r="http://schemas.openxmlformats.org/officeDocument/2006/relationships" xmlns:p="http://schemas.openxmlformats.org/presentationml/2006/main" showMasterSp="0" showMasterPhAnim="0">
   <p:cSld>
     <p:spTree>
@@ -1102,7 +1000,7 @@
 </p:notes>
 </file>
 
-<file path=ppt/notesSlides/notesSlide15.xml><?xml version="1.0" encoding="utf-8"?>
+<file path=ppt/notesSlides/notesSlide14.xml><?xml version="1.0" encoding="utf-8"?>
 <p:notes xmlns:a="http://schemas.openxmlformats.org/drawingml/2006/main" xmlns:r="http://schemas.openxmlformats.org/officeDocument/2006/relationships" xmlns:p="http://schemas.openxmlformats.org/presentationml/2006/main" showMasterSp="0" showMasterPhAnim="0">
   <p:cSld>
     <p:spTree>
@@ -1203,7 +1101,7 @@
 </p:notes>
 </file>
 
-<file path=ppt/notesSlides/notesSlide16.xml><?xml version="1.0" encoding="utf-8"?>
+<file path=ppt/notesSlides/notesSlide15.xml><?xml version="1.0" encoding="utf-8"?>
 <p:notes xmlns:a="http://schemas.openxmlformats.org/drawingml/2006/main" xmlns:r="http://schemas.openxmlformats.org/officeDocument/2006/relationships" xmlns:p="http://schemas.openxmlformats.org/presentationml/2006/main" showMasterSp="0" showMasterPhAnim="0">
   <p:cSld>
     <p:spTree>
@@ -1304,7 +1202,7 @@
 </p:notes>
 </file>
 
-<file path=ppt/notesSlides/notesSlide17.xml><?xml version="1.0" encoding="utf-8"?>
+<file path=ppt/notesSlides/notesSlide16.xml><?xml version="1.0" encoding="utf-8"?>
 <p:notes xmlns:a="http://schemas.openxmlformats.org/drawingml/2006/main" xmlns:r="http://schemas.openxmlformats.org/officeDocument/2006/relationships" xmlns:p="http://schemas.openxmlformats.org/presentationml/2006/main" showMasterSp="0" showMasterPhAnim="0">
   <p:cSld>
     <p:spTree>
@@ -1405,7 +1303,7 @@
 </p:notes>
 </file>
 
-<file path=ppt/notesSlides/notesSlide18.xml><?xml version="1.0" encoding="utf-8"?>
+<file path=ppt/notesSlides/notesSlide17.xml><?xml version="1.0" encoding="utf-8"?>
 <p:notes xmlns:a="http://schemas.openxmlformats.org/drawingml/2006/main" xmlns:r="http://schemas.openxmlformats.org/officeDocument/2006/relationships" xmlns:p="http://schemas.openxmlformats.org/presentationml/2006/main" showMasterSp="0" showMasterPhAnim="0">
   <p:cSld>
     <p:spTree>
@@ -6843,66 +6741,6 @@
   <p:cSld>
     <p:spTree>
       <p:nvGrpSpPr>
-        <p:cNvPr id="1" name="Shape 122"/>
-        <p:cNvGrpSpPr/>
-        <p:nvPr/>
-      </p:nvGrpSpPr>
-      <p:grpSpPr>
-        <a:xfrm>
-          <a:off x="0" y="0"/>
-          <a:ext cx="0" cy="0"/>
-          <a:chOff x="0" y="0"/>
-          <a:chExt cx="0" cy="0"/>
-        </a:xfrm>
-      </p:grpSpPr>
-      <p:pic>
-        <p:nvPicPr>
-          <p:cNvPr id="123" name="Shape 123" descr="infrequent_name.png"/>
-          <p:cNvPicPr preferRelativeResize="0"/>
-          <p:nvPr/>
-        </p:nvPicPr>
-        <p:blipFill>
-          <a:blip r:embed="rId3">
-            <a:alphaModFix/>
-          </a:blip>
-          <a:stretch>
-            <a:fillRect/>
-          </a:stretch>
-        </p:blipFill>
-        <p:spPr>
-          <a:xfrm>
-            <a:off x="1614487" y="571500"/>
-            <a:ext cx="5915025" cy="4000500"/>
-          </a:xfrm>
-          <a:prstGeom prst="rect">
-            <a:avLst/>
-          </a:prstGeom>
-          <a:noFill/>
-          <a:ln>
-            <a:noFill/>
-          </a:ln>
-        </p:spPr>
-      </p:pic>
-    </p:spTree>
-  </p:cSld>
-  <p:clrMapOvr>
-    <a:masterClrMapping/>
-  </p:clrMapOvr>
-  <p:timing>
-    <p:tnLst>
-      <p:par>
-        <p:cTn xmlns:p14="http://schemas.microsoft.com/office/powerpoint/2010/main" id="1" dur="indefinite" restart="never" nodeType="tmRoot"/>
-      </p:par>
-    </p:tnLst>
-  </p:timing>
-</p:sld>
-</file>
-
-<file path=ppt/slides/slide12.xml><?xml version="1.0" encoding="utf-8"?>
-<p:sld xmlns:a="http://schemas.openxmlformats.org/drawingml/2006/main" xmlns:r="http://schemas.openxmlformats.org/officeDocument/2006/relationships" xmlns:p="http://schemas.openxmlformats.org/presentationml/2006/main">
-  <p:cSld>
-    <p:spTree>
-      <p:nvGrpSpPr>
         <p:cNvPr id="1" name="Shape 127"/>
         <p:cNvGrpSpPr/>
         <p:nvPr/>
@@ -7304,7 +7142,7 @@
 </p:sld>
 </file>
 
-<file path=ppt/slides/slide13.xml><?xml version="1.0" encoding="utf-8"?>
+<file path=ppt/slides/slide12.xml><?xml version="1.0" encoding="utf-8"?>
 <p:sld xmlns:a="http://schemas.openxmlformats.org/drawingml/2006/main" xmlns:r="http://schemas.openxmlformats.org/officeDocument/2006/relationships" xmlns:p="http://schemas.openxmlformats.org/presentationml/2006/main">
   <p:cSld>
     <p:spTree>
@@ -7490,7 +7328,7 @@
 </p:sld>
 </file>
 
-<file path=ppt/slides/slide14.xml><?xml version="1.0" encoding="utf-8"?>
+<file path=ppt/slides/slide13.xml><?xml version="1.0" encoding="utf-8"?>
 <p:sld xmlns:a="http://schemas.openxmlformats.org/drawingml/2006/main" xmlns:r="http://schemas.openxmlformats.org/officeDocument/2006/relationships" xmlns:p="http://schemas.openxmlformats.org/presentationml/2006/main">
   <p:cSld>
     <p:spTree>
@@ -7765,13 +7603,13 @@
   <p:clrMapOvr>
     <a:masterClrMapping/>
   </p:clrMapOvr>
-  <mc:AlternateContent xmlns:mc="http://schemas.openxmlformats.org/markup-compatibility/2006">
-    <mc:Choice xmlns:p14="http://schemas.microsoft.com/office/powerpoint/2010/main" Requires="p14">
+  <mc:AlternateContent xmlns:mc="http://schemas.openxmlformats.org/markup-compatibility/2006" xmlns:p14="http://schemas.microsoft.com/office/powerpoint/2010/main">
+    <mc:Choice Requires="p14">
       <p:transition spd="med" p14:dur="700">
         <p:fade/>
       </p:transition>
     </mc:Choice>
-    <mc:Fallback>
+    <mc:Fallback xmlns="">
       <p:transition xmlns:p14="http://schemas.microsoft.com/office/powerpoint/2010/main" spd="med">
         <p:fade/>
       </p:transition>
@@ -7855,7 +7693,7 @@
 </p:sld>
 </file>
 
-<file path=ppt/slides/slide15.xml><?xml version="1.0" encoding="utf-8"?>
+<file path=ppt/slides/slide14.xml><?xml version="1.0" encoding="utf-8"?>
 <p:sld xmlns:a="http://schemas.openxmlformats.org/drawingml/2006/main" xmlns:r="http://schemas.openxmlformats.org/officeDocument/2006/relationships" xmlns:p="http://schemas.openxmlformats.org/presentationml/2006/main">
   <p:cSld>
     <p:spTree>
@@ -8099,7 +7937,7 @@
 </p:sld>
 </file>
 
-<file path=ppt/slides/slide16.xml><?xml version="1.0" encoding="utf-8"?>
+<file path=ppt/slides/slide15.xml><?xml version="1.0" encoding="utf-8"?>
 <p:sld xmlns:a="http://schemas.openxmlformats.org/drawingml/2006/main" xmlns:r="http://schemas.openxmlformats.org/officeDocument/2006/relationships" xmlns:p="http://schemas.openxmlformats.org/presentationml/2006/main">
   <p:cSld>
     <p:spTree>
@@ -8159,7 +7997,7 @@
 </p:sld>
 </file>
 
-<file path=ppt/slides/slide17.xml><?xml version="1.0" encoding="utf-8"?>
+<file path=ppt/slides/slide16.xml><?xml version="1.0" encoding="utf-8"?>
 <p:sld xmlns:a="http://schemas.openxmlformats.org/drawingml/2006/main" xmlns:r="http://schemas.openxmlformats.org/officeDocument/2006/relationships" xmlns:p="http://schemas.openxmlformats.org/presentationml/2006/main">
   <p:cSld>
     <p:spTree>
@@ -8422,7 +8260,7 @@
 </p:sld>
 </file>
 
-<file path=ppt/slides/slide18.xml><?xml version="1.0" encoding="utf-8"?>
+<file path=ppt/slides/slide17.xml><?xml version="1.0" encoding="utf-8"?>
 <p:sld xmlns:a="http://schemas.openxmlformats.org/drawingml/2006/main" xmlns:r="http://schemas.openxmlformats.org/officeDocument/2006/relationships" xmlns:p="http://schemas.openxmlformats.org/presentationml/2006/main">
   <p:cSld>
     <p:spTree>

</xml_diff>